<commit_message>
AutoZoomTest: Add separator slide before clipboard restoration tests
</commit_message>
<xml_diff>
--- a/doc/test/ZoomLab/AutoZoom.pptx
+++ b/doc/test/ZoomLab/AutoZoom.pptx
@@ -37,19 +37,20 @@
     <p:sldId id="348" r:id="rId31"/>
     <p:sldId id="316" r:id="rId32"/>
     <p:sldId id="317" r:id="rId33"/>
-    <p:sldId id="350" r:id="rId34"/>
-    <p:sldId id="360" r:id="rId35"/>
-    <p:sldId id="351" r:id="rId36"/>
-    <p:sldId id="352" r:id="rId37"/>
-    <p:sldId id="361" r:id="rId38"/>
-    <p:sldId id="358" r:id="rId39"/>
-    <p:sldId id="354" r:id="rId40"/>
-    <p:sldId id="362" r:id="rId41"/>
-    <p:sldId id="355" r:id="rId42"/>
-    <p:sldId id="356" r:id="rId43"/>
-    <p:sldId id="363" r:id="rId44"/>
-    <p:sldId id="359" r:id="rId45"/>
-    <p:sldId id="312" r:id="rId46"/>
+    <p:sldId id="364" r:id="rId34"/>
+    <p:sldId id="350" r:id="rId35"/>
+    <p:sldId id="360" r:id="rId36"/>
+    <p:sldId id="351" r:id="rId37"/>
+    <p:sldId id="352" r:id="rId38"/>
+    <p:sldId id="361" r:id="rId39"/>
+    <p:sldId id="358" r:id="rId40"/>
+    <p:sldId id="354" r:id="rId41"/>
+    <p:sldId id="362" r:id="rId42"/>
+    <p:sldId id="355" r:id="rId43"/>
+    <p:sldId id="356" r:id="rId44"/>
+    <p:sldId id="363" r:id="rId45"/>
+    <p:sldId id="359" r:id="rId46"/>
+    <p:sldId id="312" r:id="rId47"/>
   </p:sldIdLst>
   <p:sldSz cx="9144000" cy="6858000" type="screen4x3"/>
   <p:notesSz cx="6858000" cy="9144000"/>
@@ -187,6 +188,7 @@
             <p14:sldId id="348"/>
             <p14:sldId id="316"/>
             <p14:sldId id="317"/>
+            <p14:sldId id="364"/>
             <p14:sldId id="350"/>
             <p14:sldId id="360"/>
             <p14:sldId id="351"/>
@@ -17905,14 +17907,6 @@
 <file path=ppt/slides/slide31.xml><?xml version="1.0" encoding="utf-8"?>
 <p:sld xmlns:a="http://schemas.openxmlformats.org/drawingml/2006/main" xmlns:r="http://schemas.openxmlformats.org/officeDocument/2006/relationships" xmlns:p="http://schemas.openxmlformats.org/presentationml/2006/main">
   <p:cSld>
-    <p:bg>
-      <p:bgPr>
-        <a:solidFill>
-          <a:schemeClr val="bg1"/>
-        </a:solidFill>
-        <a:effectLst/>
-      </p:bgPr>
-    </p:bg>
     <p:spTree>
       <p:nvGrpSpPr>
         <p:cNvPr id="1" name=""/>
@@ -17927,264 +17921,77 @@
           <a:chExt cx="0" cy="0"/>
         </a:xfrm>
       </p:grpSpPr>
-      <p:pic>
-        <p:nvPicPr>
-          <p:cNvPr id="10" name="pictocopy">
-            <a:extLst>
-              <a:ext uri="{FF2B5EF4-FFF2-40B4-BE49-F238E27FC236}">
-                <a16:creationId xmlns:a16="http://schemas.microsoft.com/office/drawing/2014/main" id="{3CA64550-5AE2-4F22-9C68-8C66CE5663E9}"/>
-              </a:ext>
-            </a:extLst>
-          </p:cNvPr>
-          <p:cNvPicPr>
-            <a:picLocks noChangeAspect="1"/>
-          </p:cNvPicPr>
-          <p:nvPr/>
-        </p:nvPicPr>
-        <p:blipFill>
-          <a:blip r:embed="rId2"/>
-          <a:stretch>
-            <a:fillRect/>
-          </a:stretch>
-        </p:blipFill>
-        <p:spPr>
-          <a:xfrm>
-            <a:off x="5722538" y="2066426"/>
-            <a:ext cx="1889924" cy="2725148"/>
-          </a:xfrm>
-          <a:prstGeom prst="rect">
-            <a:avLst/>
-          </a:prstGeom>
-        </p:spPr>
-      </p:pic>
-      <p:sp>
-        <p:nvSpPr>
-          <p:cNvPr id="11" name="Drill Down This Shape">
-            <a:extLst>
-              <a:ext uri="{FF2B5EF4-FFF2-40B4-BE49-F238E27FC236}">
-                <a16:creationId xmlns:a16="http://schemas.microsoft.com/office/drawing/2014/main" id="{FBDDFFDE-4021-4A20-9F88-CF054D99B4A1}"/>
-              </a:ext>
-            </a:extLst>
-          </p:cNvPr>
-          <p:cNvSpPr/>
-          <p:nvPr/>
-        </p:nvSpPr>
-        <p:spPr>
-          <a:xfrm>
-            <a:off x="2209800" y="2902632"/>
-            <a:ext cx="1403648" cy="1052736"/>
-          </a:xfrm>
-          <a:prstGeom prst="rect">
-            <a:avLst/>
-          </a:prstGeom>
-          <a:ln/>
-        </p:spPr>
-        <p:style>
-          <a:lnRef idx="2">
-            <a:schemeClr val="accent1">
-              <a:shade val="50000"/>
-            </a:schemeClr>
-          </a:lnRef>
-          <a:fillRef idx="1">
-            <a:schemeClr val="accent1"/>
-          </a:fillRef>
-          <a:effectRef idx="0">
-            <a:schemeClr val="accent1"/>
-          </a:effectRef>
-          <a:fontRef idx="minor">
-            <a:schemeClr val="lt1"/>
-          </a:fontRef>
-        </p:style>
-        <p:txBody>
-          <a:bodyPr rtlCol="0" anchor="ctr"/>
-          <a:lstStyle/>
-          <a:p>
-            <a:pPr algn="ctr"/>
-            <a:r>
-              <a:rPr lang="en-US" sz="2800"/>
-              <a:t>Drill Down</a:t>
-            </a:r>
-            <a:endParaRPr lang="en-SG" sz="2800" dirty="0"/>
+      <p:sp>
+        <p:nvSpPr>
+          <p:cNvPr id="2" name="Title 1"/>
+          <p:cNvSpPr>
+            <a:spLocks noGrp="1"/>
+          </p:cNvSpPr>
+          <p:nvPr>
+            <p:ph type="title"/>
+          </p:nvPr>
+        </p:nvSpPr>
+        <p:spPr/>
+        <p:txBody>
+          <a:bodyPr/>
+          <a:lstStyle/>
+          <a:p>
+            <a:r>
+              <a:rPr lang="en-US" dirty="0"/>
+              <a:t>Auto Zoom:: Clipboard Restoration</a:t>
+            </a:r>
+            <a:endParaRPr lang="en-SG" dirty="0"/>
+          </a:p>
+        </p:txBody>
+      </p:sp>
+      <p:sp>
+        <p:nvSpPr>
+          <p:cNvPr id="3" name="Content Placeholder 2"/>
+          <p:cNvSpPr>
+            <a:spLocks noGrp="1"/>
+          </p:cNvSpPr>
+          <p:nvPr>
+            <p:ph idx="1"/>
+          </p:nvPr>
+        </p:nvSpPr>
+        <p:spPr/>
+        <p:txBody>
+          <a:bodyPr/>
+          <a:lstStyle/>
+          <a:p>
+            <a:r>
+              <a:rPr lang="en-SG" dirty="0"/>
+              <a:t>1) Copy the right shape to your clipboard</a:t>
+            </a:r>
+          </a:p>
+          <a:p>
+            <a:r>
+              <a:rPr lang="en-SG" dirty="0"/>
+              <a:t>2) Attempt the stated action in the action slide</a:t>
+            </a:r>
+          </a:p>
+          <a:p>
+            <a:r>
+              <a:rPr lang="en-SG" dirty="0"/>
+              <a:t>3) Verify that your clipboard has not been overridden</a:t>
+            </a:r>
           </a:p>
         </p:txBody>
       </p:sp>
     </p:spTree>
     <p:extLst>
       <p:ext uri="{BB962C8B-B14F-4D97-AF65-F5344CB8AC3E}">
-        <p14:creationId xmlns:p14="http://schemas.microsoft.com/office/powerpoint/2010/main" val="2596917018"/>
+        <p14:creationId xmlns:p14="http://schemas.microsoft.com/office/powerpoint/2010/main" val="2173324487"/>
       </p:ext>
     </p:extLst>
   </p:cSld>
   <p:clrMapOvr>
     <a:masterClrMapping/>
   </p:clrMapOvr>
-  <mc:AlternateContent xmlns:mc="http://schemas.openxmlformats.org/markup-compatibility/2006" xmlns:p14="http://schemas.microsoft.com/office/powerpoint/2010/main">
-    <mc:Choice Requires="p14">
-      <p:transition spd="slow" p14:dur="1500">
-        <p:split orient="vert"/>
-      </p:transition>
-    </mc:Choice>
-    <mc:Fallback xmlns="">
-      <p:transition spd="slow">
-        <p:split orient="vert"/>
-      </p:transition>
-    </mc:Fallback>
-  </mc:AlternateContent>
 </p:sld>
 </file>
 
 <file path=ppt/slides/slide32.xml><?xml version="1.0" encoding="utf-8"?>
-<p:sld xmlns:a="http://schemas.openxmlformats.org/drawingml/2006/main" xmlns:r="http://schemas.openxmlformats.org/officeDocument/2006/relationships" xmlns:p="http://schemas.openxmlformats.org/presentationml/2006/main">
-  <p:cSld>
-    <p:bg>
-      <p:bgPr>
-        <a:solidFill>
-          <a:schemeClr val="bg1"/>
-        </a:solidFill>
-        <a:effectLst/>
-      </p:bgPr>
-    </p:bg>
-    <p:spTree>
-      <p:nvGrpSpPr>
-        <p:cNvPr id="1" name=""/>
-        <p:cNvGrpSpPr/>
-        <p:nvPr/>
-      </p:nvGrpSpPr>
-      <p:grpSpPr>
-        <a:xfrm>
-          <a:off x="0" y="0"/>
-          <a:ext cx="0" cy="0"/>
-          <a:chOff x="0" y="0"/>
-          <a:chExt cx="0" cy="0"/>
-        </a:xfrm>
-      </p:grpSpPr>
-      <p:sp>
-        <p:nvSpPr>
-          <p:cNvPr id="11" name="Drill Down This Shape">
-            <a:extLst>
-              <a:ext uri="{FF2B5EF4-FFF2-40B4-BE49-F238E27FC236}">
-                <a16:creationId xmlns:a16="http://schemas.microsoft.com/office/drawing/2014/main" id="{FBDDFFDE-4021-4A20-9F88-CF054D99B4A1}"/>
-              </a:ext>
-            </a:extLst>
-          </p:cNvPr>
-          <p:cNvSpPr/>
-          <p:nvPr/>
-        </p:nvSpPr>
-        <p:spPr>
-          <a:xfrm>
-            <a:off x="2209800" y="2902632"/>
-            <a:ext cx="1403648" cy="1052736"/>
-          </a:xfrm>
-          <a:prstGeom prst="rect">
-            <a:avLst/>
-          </a:prstGeom>
-          <a:ln/>
-        </p:spPr>
-        <p:style>
-          <a:lnRef idx="2">
-            <a:schemeClr val="accent1">
-              <a:shade val="50000"/>
-            </a:schemeClr>
-          </a:lnRef>
-          <a:fillRef idx="1">
-            <a:schemeClr val="accent1"/>
-          </a:fillRef>
-          <a:effectRef idx="0">
-            <a:schemeClr val="accent1"/>
-          </a:effectRef>
-          <a:fontRef idx="minor">
-            <a:schemeClr val="lt1"/>
-          </a:fontRef>
-        </p:style>
-        <p:txBody>
-          <a:bodyPr rtlCol="0" anchor="ctr"/>
-          <a:lstStyle/>
-          <a:p>
-            <a:pPr algn="ctr"/>
-            <a:r>
-              <a:rPr lang="en-US" sz="2800"/>
-              <a:t>Drill Down</a:t>
-            </a:r>
-            <a:endParaRPr lang="en-SG" sz="2800" dirty="0"/>
-          </a:p>
-        </p:txBody>
-      </p:sp>
-      <p:sp>
-        <p:nvSpPr>
-          <p:cNvPr id="6" name="Rectangle 1">
-            <a:extLst>
-              <a:ext uri="{FF2B5EF4-FFF2-40B4-BE49-F238E27FC236}">
-                <a16:creationId xmlns:a16="http://schemas.microsoft.com/office/drawing/2014/main" id="{013CB590-3DE2-4D70-84DD-571897194DC7}"/>
-              </a:ext>
-            </a:extLst>
-          </p:cNvPr>
-          <p:cNvSpPr/>
-          <p:nvPr/>
-        </p:nvSpPr>
-        <p:spPr>
-          <a:xfrm>
-            <a:off x="4572000" y="2092356"/>
-            <a:ext cx="4378668" cy="2673288"/>
-          </a:xfrm>
-          <a:prstGeom prst="rect">
-            <a:avLst/>
-          </a:prstGeom>
-          <a:ln/>
-        </p:spPr>
-        <p:style>
-          <a:lnRef idx="2">
-            <a:schemeClr val="accent1">
-              <a:shade val="50000"/>
-            </a:schemeClr>
-          </a:lnRef>
-          <a:fillRef idx="1">
-            <a:schemeClr val="accent1"/>
-          </a:fillRef>
-          <a:effectRef idx="0">
-            <a:schemeClr val="accent1"/>
-          </a:effectRef>
-          <a:fontRef idx="minor">
-            <a:schemeClr val="lt1"/>
-          </a:fontRef>
-        </p:style>
-        <p:txBody>
-          <a:bodyPr rtlCol="0" anchor="ctr"/>
-          <a:lstStyle/>
-          <a:p>
-            <a:pPr algn="ctr"/>
-            <a:r>
-              <a:rPr lang="en-US" sz="2800" dirty="0"/>
-              <a:t>Action Slide</a:t>
-            </a:r>
-          </a:p>
-        </p:txBody>
-      </p:sp>
-    </p:spTree>
-    <p:extLst>
-      <p:ext uri="{BB962C8B-B14F-4D97-AF65-F5344CB8AC3E}">
-        <p14:creationId xmlns:p14="http://schemas.microsoft.com/office/powerpoint/2010/main" val="633208659"/>
-      </p:ext>
-    </p:extLst>
-  </p:cSld>
-  <p:clrMapOvr>
-    <a:masterClrMapping/>
-  </p:clrMapOvr>
-  <mc:AlternateContent xmlns:mc="http://schemas.openxmlformats.org/markup-compatibility/2006" xmlns:p14="http://schemas.microsoft.com/office/powerpoint/2010/main">
-    <mc:Choice Requires="p14">
-      <p:transition spd="slow" p14:dur="1500">
-        <p:split orient="vert"/>
-      </p:transition>
-    </mc:Choice>
-    <mc:Fallback xmlns="">
-      <p:transition spd="slow">
-        <p:split orient="vert"/>
-      </p:transition>
-    </mc:Fallback>
-  </mc:AlternateContent>
-</p:sld>
-</file>
-
-<file path=ppt/slides/slide33.xml><?xml version="1.0" encoding="utf-8"?>
 <p:sld xmlns:a="http://schemas.openxmlformats.org/drawingml/2006/main" xmlns:r="http://schemas.openxmlformats.org/officeDocument/2006/relationships" xmlns:p="http://schemas.openxmlformats.org/presentationml/2006/main">
   <p:cSld>
     <p:bg>
@@ -18283,91 +18090,17 @@
           <a:p>
             <a:pPr algn="ctr"/>
             <a:r>
-              <a:rPr lang="en-US" sz="2800" dirty="0"/>
+              <a:rPr lang="en-US" sz="2800"/>
               <a:t>Drill Down</a:t>
             </a:r>
             <a:endParaRPr lang="en-SG" sz="2800" dirty="0"/>
-          </a:p>
-        </p:txBody>
-      </p:sp>
-      <p:pic>
-        <p:nvPicPr>
-          <p:cNvPr id="6" name="copied">
-            <a:extLst>
-              <a:ext uri="{FF2B5EF4-FFF2-40B4-BE49-F238E27FC236}">
-                <a16:creationId xmlns:a16="http://schemas.microsoft.com/office/drawing/2014/main" id="{723AD821-12F3-4268-ACEE-7DA402D9E1DF}"/>
-              </a:ext>
-            </a:extLst>
-          </p:cNvPr>
-          <p:cNvPicPr>
-            <a:picLocks noChangeAspect="1"/>
-          </p:cNvPicPr>
-          <p:nvPr/>
-        </p:nvPicPr>
-        <p:blipFill>
-          <a:blip r:embed="rId2"/>
-          <a:stretch>
-            <a:fillRect/>
-          </a:stretch>
-        </p:blipFill>
-        <p:spPr>
-          <a:xfrm>
-            <a:off x="5874938" y="2218826"/>
-            <a:ext cx="1889924" cy="2725148"/>
-          </a:xfrm>
-          <a:prstGeom prst="rect">
-            <a:avLst/>
-          </a:prstGeom>
-        </p:spPr>
-      </p:pic>
-      <p:sp>
-        <p:nvSpPr>
-          <p:cNvPr id="13" name="text 3">
-            <a:extLst>
-              <a:ext uri="{FF2B5EF4-FFF2-40B4-BE49-F238E27FC236}">
-                <a16:creationId xmlns:a16="http://schemas.microsoft.com/office/drawing/2014/main" id="{75BF3545-A381-418B-A129-3AB0993C4CD8}"/>
-              </a:ext>
-            </a:extLst>
-          </p:cNvPr>
-          <p:cNvSpPr txBox="1"/>
-          <p:nvPr/>
-        </p:nvSpPr>
-        <p:spPr>
-          <a:xfrm>
-            <a:off x="953869" y="6096000"/>
-            <a:ext cx="7742761" cy="523220"/>
-          </a:xfrm>
-          <a:prstGeom prst="rect">
-            <a:avLst/>
-          </a:prstGeom>
-          <a:noFill/>
-        </p:spPr>
-        <p:txBody>
-          <a:bodyPr wrap="none" rtlCol="0">
-            <a:spAutoFit/>
-          </a:bodyPr>
-          <a:lstStyle/>
-          <a:p>
-            <a:r>
-              <a:rPr lang="en-US" sz="2800" b="1" dirty="0">
-                <a:solidFill>
-                  <a:schemeClr val="accent1"/>
-                </a:solidFill>
-              </a:rPr>
-              <a:t>Expected Output (pasted object is the right shape )</a:t>
-            </a:r>
-            <a:endParaRPr lang="en-SG" sz="2800" b="1" dirty="0">
-              <a:solidFill>
-                <a:schemeClr val="accent1"/>
-              </a:solidFill>
-            </a:endParaRPr>
           </a:p>
         </p:txBody>
       </p:sp>
     </p:spTree>
     <p:extLst>
       <p:ext uri="{BB962C8B-B14F-4D97-AF65-F5344CB8AC3E}">
-        <p14:creationId xmlns:p14="http://schemas.microsoft.com/office/powerpoint/2010/main" val="2718630518"/>
+        <p14:creationId xmlns:p14="http://schemas.microsoft.com/office/powerpoint/2010/main" val="2596917018"/>
       </p:ext>
     </p:extLst>
   </p:cSld>
@@ -18376,13 +18109,164 @@
   </p:clrMapOvr>
   <mc:AlternateContent xmlns:mc="http://schemas.openxmlformats.org/markup-compatibility/2006" xmlns:p14="http://schemas.microsoft.com/office/powerpoint/2010/main">
     <mc:Choice Requires="p14">
-      <p:transition p14:dur="250">
-        <p:fade/>
+      <p:transition spd="slow" p14:dur="1500">
+        <p:split orient="vert"/>
       </p:transition>
     </mc:Choice>
     <mc:Fallback xmlns="">
-      <p:transition>
-        <p:fade/>
+      <p:transition spd="slow">
+        <p:split orient="vert"/>
+      </p:transition>
+    </mc:Fallback>
+  </mc:AlternateContent>
+</p:sld>
+</file>
+
+<file path=ppt/slides/slide33.xml><?xml version="1.0" encoding="utf-8"?>
+<p:sld xmlns:a="http://schemas.openxmlformats.org/drawingml/2006/main" xmlns:r="http://schemas.openxmlformats.org/officeDocument/2006/relationships" xmlns:p="http://schemas.openxmlformats.org/presentationml/2006/main">
+  <p:cSld>
+    <p:bg>
+      <p:bgPr>
+        <a:solidFill>
+          <a:schemeClr val="bg1"/>
+        </a:solidFill>
+        <a:effectLst/>
+      </p:bgPr>
+    </p:bg>
+    <p:spTree>
+      <p:nvGrpSpPr>
+        <p:cNvPr id="1" name=""/>
+        <p:cNvGrpSpPr/>
+        <p:nvPr/>
+      </p:nvGrpSpPr>
+      <p:grpSpPr>
+        <a:xfrm>
+          <a:off x="0" y="0"/>
+          <a:ext cx="0" cy="0"/>
+          <a:chOff x="0" y="0"/>
+          <a:chExt cx="0" cy="0"/>
+        </a:xfrm>
+      </p:grpSpPr>
+      <p:sp>
+        <p:nvSpPr>
+          <p:cNvPr id="11" name="Drill Down This Shape">
+            <a:extLst>
+              <a:ext uri="{FF2B5EF4-FFF2-40B4-BE49-F238E27FC236}">
+                <a16:creationId xmlns:a16="http://schemas.microsoft.com/office/drawing/2014/main" id="{FBDDFFDE-4021-4A20-9F88-CF054D99B4A1}"/>
+              </a:ext>
+            </a:extLst>
+          </p:cNvPr>
+          <p:cNvSpPr/>
+          <p:nvPr/>
+        </p:nvSpPr>
+        <p:spPr>
+          <a:xfrm>
+            <a:off x="2209800" y="2902632"/>
+            <a:ext cx="1403648" cy="1052736"/>
+          </a:xfrm>
+          <a:prstGeom prst="rect">
+            <a:avLst/>
+          </a:prstGeom>
+          <a:ln/>
+        </p:spPr>
+        <p:style>
+          <a:lnRef idx="2">
+            <a:schemeClr val="accent1">
+              <a:shade val="50000"/>
+            </a:schemeClr>
+          </a:lnRef>
+          <a:fillRef idx="1">
+            <a:schemeClr val="accent1"/>
+          </a:fillRef>
+          <a:effectRef idx="0">
+            <a:schemeClr val="accent1"/>
+          </a:effectRef>
+          <a:fontRef idx="minor">
+            <a:schemeClr val="lt1"/>
+          </a:fontRef>
+        </p:style>
+        <p:txBody>
+          <a:bodyPr rtlCol="0" anchor="ctr"/>
+          <a:lstStyle/>
+          <a:p>
+            <a:pPr algn="ctr"/>
+            <a:r>
+              <a:rPr lang="en-US" sz="2800"/>
+              <a:t>Drill Down</a:t>
+            </a:r>
+            <a:endParaRPr lang="en-SG" sz="2800" dirty="0"/>
+          </a:p>
+        </p:txBody>
+      </p:sp>
+      <p:sp>
+        <p:nvSpPr>
+          <p:cNvPr id="6" name="Rectangle 1">
+            <a:extLst>
+              <a:ext uri="{FF2B5EF4-FFF2-40B4-BE49-F238E27FC236}">
+                <a16:creationId xmlns:a16="http://schemas.microsoft.com/office/drawing/2014/main" id="{013CB590-3DE2-4D70-84DD-571897194DC7}"/>
+              </a:ext>
+            </a:extLst>
+          </p:cNvPr>
+          <p:cNvSpPr/>
+          <p:nvPr/>
+        </p:nvSpPr>
+        <p:spPr>
+          <a:xfrm>
+            <a:off x="4572000" y="2092356"/>
+            <a:ext cx="4378668" cy="2673288"/>
+          </a:xfrm>
+          <a:prstGeom prst="rect">
+            <a:avLst/>
+          </a:prstGeom>
+          <a:ln/>
+        </p:spPr>
+        <p:style>
+          <a:lnRef idx="2">
+            <a:schemeClr val="accent1">
+              <a:shade val="50000"/>
+            </a:schemeClr>
+          </a:lnRef>
+          <a:fillRef idx="1">
+            <a:schemeClr val="accent1"/>
+          </a:fillRef>
+          <a:effectRef idx="0">
+            <a:schemeClr val="accent1"/>
+          </a:effectRef>
+          <a:fontRef idx="minor">
+            <a:schemeClr val="lt1"/>
+          </a:fontRef>
+        </p:style>
+        <p:txBody>
+          <a:bodyPr rtlCol="0" anchor="ctr"/>
+          <a:lstStyle/>
+          <a:p>
+            <a:pPr algn="ctr"/>
+            <a:r>
+              <a:rPr lang="en-US" sz="2800" dirty="0"/>
+              <a:t>Action Slide</a:t>
+            </a:r>
+          </a:p>
+        </p:txBody>
+      </p:sp>
+    </p:spTree>
+    <p:extLst>
+      <p:ext uri="{BB962C8B-B14F-4D97-AF65-F5344CB8AC3E}">
+        <p14:creationId xmlns:p14="http://schemas.microsoft.com/office/powerpoint/2010/main" val="633208659"/>
+      </p:ext>
+    </p:extLst>
+  </p:cSld>
+  <p:clrMapOvr>
+    <a:masterClrMapping/>
+  </p:clrMapOvr>
+  <mc:AlternateContent xmlns:mc="http://schemas.openxmlformats.org/markup-compatibility/2006" xmlns:p14="http://schemas.microsoft.com/office/powerpoint/2010/main">
+    <mc:Choice Requires="p14">
+      <p:transition spd="slow" p14:dur="1500">
+        <p:split orient="vert"/>
+      </p:transition>
+    </mc:Choice>
+    <mc:Fallback xmlns="">
+      <p:transition spd="slow">
+        <p:split orient="vert"/>
       </p:transition>
     </mc:Fallback>
   </mc:AlternateContent>
@@ -18458,8 +18342,8 @@
         </p:nvSpPr>
         <p:spPr>
           <a:xfrm>
-            <a:off x="2042324" y="2746716"/>
-            <a:ext cx="2057400" cy="1364568"/>
+            <a:off x="2209800" y="2902632"/>
+            <a:ext cx="1403648" cy="1052736"/>
           </a:xfrm>
           <a:prstGeom prst="rect">
             <a:avLst/>
@@ -18489,16 +18373,90 @@
             <a:pPr algn="ctr"/>
             <a:r>
               <a:rPr lang="en-US" sz="2800" dirty="0"/>
-              <a:t>Drill Down Background</a:t>
+              <a:t>Drill Down</a:t>
             </a:r>
             <a:endParaRPr lang="en-SG" sz="2800" dirty="0"/>
+          </a:p>
+        </p:txBody>
+      </p:sp>
+      <p:pic>
+        <p:nvPicPr>
+          <p:cNvPr id="6" name="copied">
+            <a:extLst>
+              <a:ext uri="{FF2B5EF4-FFF2-40B4-BE49-F238E27FC236}">
+                <a16:creationId xmlns:a16="http://schemas.microsoft.com/office/drawing/2014/main" id="{723AD821-12F3-4268-ACEE-7DA402D9E1DF}"/>
+              </a:ext>
+            </a:extLst>
+          </p:cNvPr>
+          <p:cNvPicPr>
+            <a:picLocks noChangeAspect="1"/>
+          </p:cNvPicPr>
+          <p:nvPr/>
+        </p:nvPicPr>
+        <p:blipFill>
+          <a:blip r:embed="rId2"/>
+          <a:stretch>
+            <a:fillRect/>
+          </a:stretch>
+        </p:blipFill>
+        <p:spPr>
+          <a:xfrm>
+            <a:off x="5874938" y="2218826"/>
+            <a:ext cx="1889924" cy="2725148"/>
+          </a:xfrm>
+          <a:prstGeom prst="rect">
+            <a:avLst/>
+          </a:prstGeom>
+        </p:spPr>
+      </p:pic>
+      <p:sp>
+        <p:nvSpPr>
+          <p:cNvPr id="13" name="text 3">
+            <a:extLst>
+              <a:ext uri="{FF2B5EF4-FFF2-40B4-BE49-F238E27FC236}">
+                <a16:creationId xmlns:a16="http://schemas.microsoft.com/office/drawing/2014/main" id="{75BF3545-A381-418B-A129-3AB0993C4CD8}"/>
+              </a:ext>
+            </a:extLst>
+          </p:cNvPr>
+          <p:cNvSpPr txBox="1"/>
+          <p:nvPr/>
+        </p:nvSpPr>
+        <p:spPr>
+          <a:xfrm>
+            <a:off x="953869" y="6096000"/>
+            <a:ext cx="7742761" cy="523220"/>
+          </a:xfrm>
+          <a:prstGeom prst="rect">
+            <a:avLst/>
+          </a:prstGeom>
+          <a:noFill/>
+        </p:spPr>
+        <p:txBody>
+          <a:bodyPr wrap="none" rtlCol="0">
+            <a:spAutoFit/>
+          </a:bodyPr>
+          <a:lstStyle/>
+          <a:p>
+            <a:r>
+              <a:rPr lang="en-US" sz="2800" b="1" dirty="0">
+                <a:solidFill>
+                  <a:schemeClr val="accent1"/>
+                </a:solidFill>
+              </a:rPr>
+              <a:t>Expected Output (pasted object is the right shape )</a:t>
+            </a:r>
+            <a:endParaRPr lang="en-SG" sz="2800" b="1" dirty="0">
+              <a:solidFill>
+                <a:schemeClr val="accent1"/>
+              </a:solidFill>
+            </a:endParaRPr>
           </a:p>
         </p:txBody>
       </p:sp>
     </p:spTree>
     <p:extLst>
       <p:ext uri="{BB962C8B-B14F-4D97-AF65-F5344CB8AC3E}">
-        <p14:creationId xmlns:p14="http://schemas.microsoft.com/office/powerpoint/2010/main" val="975463695"/>
+        <p14:creationId xmlns:p14="http://schemas.microsoft.com/office/powerpoint/2010/main" val="2718630518"/>
       </p:ext>
     </p:extLst>
   </p:cSld>
@@ -18507,13 +18465,13 @@
   </p:clrMapOvr>
   <mc:AlternateContent xmlns:mc="http://schemas.openxmlformats.org/markup-compatibility/2006" xmlns:p14="http://schemas.microsoft.com/office/powerpoint/2010/main">
     <mc:Choice Requires="p14">
-      <p:transition spd="slow" p14:dur="1500">
-        <p:split orient="vert"/>
+      <p:transition p14:dur="250">
+        <p:fade/>
       </p:transition>
     </mc:Choice>
     <mc:Fallback xmlns="">
-      <p:transition spd="slow">
-        <p:split orient="vert"/>
+      <p:transition>
+        <p:fade/>
       </p:transition>
     </mc:Fallback>
   </mc:AlternateContent>
@@ -18521,157 +18479,6 @@
 </file>
 
 <file path=ppt/slides/slide35.xml><?xml version="1.0" encoding="utf-8"?>
-<p:sld xmlns:a="http://schemas.openxmlformats.org/drawingml/2006/main" xmlns:r="http://schemas.openxmlformats.org/officeDocument/2006/relationships" xmlns:p="http://schemas.openxmlformats.org/presentationml/2006/main">
-  <p:cSld>
-    <p:bg>
-      <p:bgPr>
-        <a:solidFill>
-          <a:schemeClr val="bg1"/>
-        </a:solidFill>
-        <a:effectLst/>
-      </p:bgPr>
-    </p:bg>
-    <p:spTree>
-      <p:nvGrpSpPr>
-        <p:cNvPr id="1" name=""/>
-        <p:cNvGrpSpPr/>
-        <p:nvPr/>
-      </p:nvGrpSpPr>
-      <p:grpSpPr>
-        <a:xfrm>
-          <a:off x="0" y="0"/>
-          <a:ext cx="0" cy="0"/>
-          <a:chOff x="0" y="0"/>
-          <a:chExt cx="0" cy="0"/>
-        </a:xfrm>
-      </p:grpSpPr>
-      <p:sp>
-        <p:nvSpPr>
-          <p:cNvPr id="11" name="Drill Down This Shape">
-            <a:extLst>
-              <a:ext uri="{FF2B5EF4-FFF2-40B4-BE49-F238E27FC236}">
-                <a16:creationId xmlns:a16="http://schemas.microsoft.com/office/drawing/2014/main" id="{FBDDFFDE-4021-4A20-9F88-CF054D99B4A1}"/>
-              </a:ext>
-            </a:extLst>
-          </p:cNvPr>
-          <p:cNvSpPr/>
-          <p:nvPr/>
-        </p:nvSpPr>
-        <p:spPr>
-          <a:xfrm>
-            <a:off x="2042324" y="2746716"/>
-            <a:ext cx="2057400" cy="1364568"/>
-          </a:xfrm>
-          <a:prstGeom prst="rect">
-            <a:avLst/>
-          </a:prstGeom>
-          <a:ln/>
-        </p:spPr>
-        <p:style>
-          <a:lnRef idx="2">
-            <a:schemeClr val="accent1">
-              <a:shade val="50000"/>
-            </a:schemeClr>
-          </a:lnRef>
-          <a:fillRef idx="1">
-            <a:schemeClr val="accent1"/>
-          </a:fillRef>
-          <a:effectRef idx="0">
-            <a:schemeClr val="accent1"/>
-          </a:effectRef>
-          <a:fontRef idx="minor">
-            <a:schemeClr val="lt1"/>
-          </a:fontRef>
-        </p:style>
-        <p:txBody>
-          <a:bodyPr rtlCol="0" anchor="ctr"/>
-          <a:lstStyle/>
-          <a:p>
-            <a:pPr algn="ctr"/>
-            <a:r>
-              <a:rPr lang="en-US" sz="2800" dirty="0"/>
-              <a:t>Drill Down Background</a:t>
-            </a:r>
-            <a:endParaRPr lang="en-SG" sz="2800" dirty="0"/>
-          </a:p>
-        </p:txBody>
-      </p:sp>
-      <p:sp>
-        <p:nvSpPr>
-          <p:cNvPr id="6" name="Rectangle 1">
-            <a:extLst>
-              <a:ext uri="{FF2B5EF4-FFF2-40B4-BE49-F238E27FC236}">
-                <a16:creationId xmlns:a16="http://schemas.microsoft.com/office/drawing/2014/main" id="{13C34EC1-02F8-43F0-91DD-92BE2A1D94E7}"/>
-              </a:ext>
-            </a:extLst>
-          </p:cNvPr>
-          <p:cNvSpPr/>
-          <p:nvPr/>
-        </p:nvSpPr>
-        <p:spPr>
-          <a:xfrm>
-            <a:off x="4572000" y="2092356"/>
-            <a:ext cx="4378668" cy="2673288"/>
-          </a:xfrm>
-          <a:prstGeom prst="rect">
-            <a:avLst/>
-          </a:prstGeom>
-          <a:ln/>
-        </p:spPr>
-        <p:style>
-          <a:lnRef idx="2">
-            <a:schemeClr val="accent1">
-              <a:shade val="50000"/>
-            </a:schemeClr>
-          </a:lnRef>
-          <a:fillRef idx="1">
-            <a:schemeClr val="accent1"/>
-          </a:fillRef>
-          <a:effectRef idx="0">
-            <a:schemeClr val="accent1"/>
-          </a:effectRef>
-          <a:fontRef idx="minor">
-            <a:schemeClr val="lt1"/>
-          </a:fontRef>
-        </p:style>
-        <p:txBody>
-          <a:bodyPr rtlCol="0" anchor="ctr"/>
-          <a:lstStyle/>
-          <a:p>
-            <a:pPr algn="ctr"/>
-            <a:r>
-              <a:rPr lang="en-US" sz="2800" dirty="0"/>
-              <a:t>Action Slide</a:t>
-            </a:r>
-          </a:p>
-        </p:txBody>
-      </p:sp>
-    </p:spTree>
-    <p:extLst>
-      <p:ext uri="{BB962C8B-B14F-4D97-AF65-F5344CB8AC3E}">
-        <p14:creationId xmlns:p14="http://schemas.microsoft.com/office/powerpoint/2010/main" val="4010197525"/>
-      </p:ext>
-    </p:extLst>
-  </p:cSld>
-  <p:clrMapOvr>
-    <a:masterClrMapping/>
-  </p:clrMapOvr>
-  <mc:AlternateContent xmlns:mc="http://schemas.openxmlformats.org/markup-compatibility/2006" xmlns:p14="http://schemas.microsoft.com/office/powerpoint/2010/main">
-    <mc:Choice Requires="p14">
-      <p:transition spd="slow" p14:dur="1500">
-        <p:split orient="vert"/>
-      </p:transition>
-    </mc:Choice>
-    <mc:Fallback xmlns="">
-      <p:transition spd="slow">
-        <p:split orient="vert"/>
-      </p:transition>
-    </mc:Fallback>
-  </mc:AlternateContent>
-</p:sld>
-</file>
-
-<file path=ppt/slides/slide36.xml><?xml version="1.0" encoding="utf-8"?>
 <p:sld xmlns:a="http://schemas.openxmlformats.org/drawingml/2006/main" xmlns:r="http://schemas.openxmlformats.org/officeDocument/2006/relationships" xmlns:p="http://schemas.openxmlformats.org/presentationml/2006/main">
   <p:cSld>
     <p:bg>
@@ -18777,84 +18584,161 @@
           </a:p>
         </p:txBody>
       </p:sp>
-      <p:pic>
-        <p:nvPicPr>
-          <p:cNvPr id="6" name="copied">
+    </p:spTree>
+    <p:extLst>
+      <p:ext uri="{BB962C8B-B14F-4D97-AF65-F5344CB8AC3E}">
+        <p14:creationId xmlns:p14="http://schemas.microsoft.com/office/powerpoint/2010/main" val="975463695"/>
+      </p:ext>
+    </p:extLst>
+  </p:cSld>
+  <p:clrMapOvr>
+    <a:masterClrMapping/>
+  </p:clrMapOvr>
+  <mc:AlternateContent xmlns:mc="http://schemas.openxmlformats.org/markup-compatibility/2006" xmlns:p14="http://schemas.microsoft.com/office/powerpoint/2010/main">
+    <mc:Choice Requires="p14">
+      <p:transition spd="slow" p14:dur="1500">
+        <p:split orient="vert"/>
+      </p:transition>
+    </mc:Choice>
+    <mc:Fallback xmlns="">
+      <p:transition spd="slow">
+        <p:split orient="vert"/>
+      </p:transition>
+    </mc:Fallback>
+  </mc:AlternateContent>
+</p:sld>
+</file>
+
+<file path=ppt/slides/slide36.xml><?xml version="1.0" encoding="utf-8"?>
+<p:sld xmlns:a="http://schemas.openxmlformats.org/drawingml/2006/main" xmlns:r="http://schemas.openxmlformats.org/officeDocument/2006/relationships" xmlns:p="http://schemas.openxmlformats.org/presentationml/2006/main">
+  <p:cSld>
+    <p:bg>
+      <p:bgPr>
+        <a:solidFill>
+          <a:schemeClr val="bg1"/>
+        </a:solidFill>
+        <a:effectLst/>
+      </p:bgPr>
+    </p:bg>
+    <p:spTree>
+      <p:nvGrpSpPr>
+        <p:cNvPr id="1" name=""/>
+        <p:cNvGrpSpPr/>
+        <p:nvPr/>
+      </p:nvGrpSpPr>
+      <p:grpSpPr>
+        <a:xfrm>
+          <a:off x="0" y="0"/>
+          <a:ext cx="0" cy="0"/>
+          <a:chOff x="0" y="0"/>
+          <a:chExt cx="0" cy="0"/>
+        </a:xfrm>
+      </p:grpSpPr>
+      <p:sp>
+        <p:nvSpPr>
+          <p:cNvPr id="11" name="Drill Down This Shape">
             <a:extLst>
               <a:ext uri="{FF2B5EF4-FFF2-40B4-BE49-F238E27FC236}">
-                <a16:creationId xmlns:a16="http://schemas.microsoft.com/office/drawing/2014/main" id="{9166C3DB-93CF-4DBE-92E2-DC201CD72C22}"/>
+                <a16:creationId xmlns:a16="http://schemas.microsoft.com/office/drawing/2014/main" id="{FBDDFFDE-4021-4A20-9F88-CF054D99B4A1}"/>
               </a:ext>
             </a:extLst>
           </p:cNvPr>
-          <p:cNvPicPr>
-            <a:picLocks noChangeAspect="1"/>
-          </p:cNvPicPr>
+          <p:cNvSpPr/>
           <p:nvPr/>
-        </p:nvPicPr>
-        <p:blipFill>
-          <a:blip r:embed="rId2"/>
-          <a:stretch>
-            <a:fillRect/>
-          </a:stretch>
-        </p:blipFill>
+        </p:nvSpPr>
         <p:spPr>
           <a:xfrm>
-            <a:off x="5874938" y="2218826"/>
-            <a:ext cx="1889924" cy="2725148"/>
+            <a:off x="2042324" y="2746716"/>
+            <a:ext cx="2057400" cy="1364568"/>
           </a:xfrm>
           <a:prstGeom prst="rect">
             <a:avLst/>
           </a:prstGeom>
+          <a:ln/>
         </p:spPr>
-      </p:pic>
-      <p:sp>
-        <p:nvSpPr>
-          <p:cNvPr id="12" name="text 3">
+        <p:style>
+          <a:lnRef idx="2">
+            <a:schemeClr val="accent1">
+              <a:shade val="50000"/>
+            </a:schemeClr>
+          </a:lnRef>
+          <a:fillRef idx="1">
+            <a:schemeClr val="accent1"/>
+          </a:fillRef>
+          <a:effectRef idx="0">
+            <a:schemeClr val="accent1"/>
+          </a:effectRef>
+          <a:fontRef idx="minor">
+            <a:schemeClr val="lt1"/>
+          </a:fontRef>
+        </p:style>
+        <p:txBody>
+          <a:bodyPr rtlCol="0" anchor="ctr"/>
+          <a:lstStyle/>
+          <a:p>
+            <a:pPr algn="ctr"/>
+            <a:r>
+              <a:rPr lang="en-US" sz="2800" dirty="0"/>
+              <a:t>Drill Down Background</a:t>
+            </a:r>
+            <a:endParaRPr lang="en-SG" sz="2800" dirty="0"/>
+          </a:p>
+        </p:txBody>
+      </p:sp>
+      <p:sp>
+        <p:nvSpPr>
+          <p:cNvPr id="6" name="Rectangle 1">
             <a:extLst>
               <a:ext uri="{FF2B5EF4-FFF2-40B4-BE49-F238E27FC236}">
-                <a16:creationId xmlns:a16="http://schemas.microsoft.com/office/drawing/2014/main" id="{D7FCBCE2-90B9-44F8-B3C5-7E45EC39B186}"/>
+                <a16:creationId xmlns:a16="http://schemas.microsoft.com/office/drawing/2014/main" id="{13C34EC1-02F8-43F0-91DD-92BE2A1D94E7}"/>
               </a:ext>
             </a:extLst>
           </p:cNvPr>
-          <p:cNvSpPr txBox="1"/>
+          <p:cNvSpPr/>
           <p:nvPr/>
         </p:nvSpPr>
         <p:spPr>
           <a:xfrm>
-            <a:off x="953869" y="6096000"/>
-            <a:ext cx="7742761" cy="523220"/>
+            <a:off x="4572000" y="2092356"/>
+            <a:ext cx="4378668" cy="2673288"/>
           </a:xfrm>
           <a:prstGeom prst="rect">
             <a:avLst/>
           </a:prstGeom>
-          <a:noFill/>
+          <a:ln/>
         </p:spPr>
-        <p:txBody>
-          <a:bodyPr wrap="none" rtlCol="0">
-            <a:spAutoFit/>
-          </a:bodyPr>
-          <a:lstStyle/>
-          <a:p>
-            <a:r>
-              <a:rPr lang="en-US" sz="2800" b="1" dirty="0">
-                <a:solidFill>
-                  <a:schemeClr val="accent1"/>
-                </a:solidFill>
-              </a:rPr>
-              <a:t>Expected Output (pasted object is the right shape )</a:t>
-            </a:r>
-            <a:endParaRPr lang="en-SG" sz="2800" b="1" dirty="0">
-              <a:solidFill>
-                <a:schemeClr val="accent1"/>
-              </a:solidFill>
-            </a:endParaRPr>
+        <p:style>
+          <a:lnRef idx="2">
+            <a:schemeClr val="accent1">
+              <a:shade val="50000"/>
+            </a:schemeClr>
+          </a:lnRef>
+          <a:fillRef idx="1">
+            <a:schemeClr val="accent1"/>
+          </a:fillRef>
+          <a:effectRef idx="0">
+            <a:schemeClr val="accent1"/>
+          </a:effectRef>
+          <a:fontRef idx="minor">
+            <a:schemeClr val="lt1"/>
+          </a:fontRef>
+        </p:style>
+        <p:txBody>
+          <a:bodyPr rtlCol="0" anchor="ctr"/>
+          <a:lstStyle/>
+          <a:p>
+            <a:pPr algn="ctr"/>
+            <a:r>
+              <a:rPr lang="en-US" sz="2800" dirty="0"/>
+              <a:t>Action Slide</a:t>
+            </a:r>
           </a:p>
         </p:txBody>
       </p:sp>
     </p:spTree>
     <p:extLst>
       <p:ext uri="{BB962C8B-B14F-4D97-AF65-F5344CB8AC3E}">
-        <p14:creationId xmlns:p14="http://schemas.microsoft.com/office/powerpoint/2010/main" val="421574400"/>
+        <p14:creationId xmlns:p14="http://schemas.microsoft.com/office/powerpoint/2010/main" val="4010197525"/>
       </p:ext>
     </p:extLst>
   </p:cSld>
@@ -18933,7 +18817,7 @@
       </p:pic>
       <p:sp>
         <p:nvSpPr>
-          <p:cNvPr id="11" name="Step Back This Shape">
+          <p:cNvPr id="11" name="Drill Down This Shape">
             <a:extLst>
               <a:ext uri="{FF2B5EF4-FFF2-40B4-BE49-F238E27FC236}">
                 <a16:creationId xmlns:a16="http://schemas.microsoft.com/office/drawing/2014/main" id="{FBDDFFDE-4021-4A20-9F88-CF054D99B4A1}"/>
@@ -18945,8 +18829,8 @@
         </p:nvSpPr>
         <p:spPr>
           <a:xfrm>
-            <a:off x="2209800" y="2902632"/>
-            <a:ext cx="1403648" cy="1052736"/>
+            <a:off x="2042324" y="2746716"/>
+            <a:ext cx="2057400" cy="1364568"/>
           </a:xfrm>
           <a:prstGeom prst="rect">
             <a:avLst/>
@@ -18976,16 +18860,90 @@
             <a:pPr algn="ctr"/>
             <a:r>
               <a:rPr lang="en-US" sz="2800" dirty="0"/>
-              <a:t>Step Back</a:t>
+              <a:t>Drill Down Background</a:t>
             </a:r>
             <a:endParaRPr lang="en-SG" sz="2800" dirty="0"/>
+          </a:p>
+        </p:txBody>
+      </p:sp>
+      <p:pic>
+        <p:nvPicPr>
+          <p:cNvPr id="6" name="copied">
+            <a:extLst>
+              <a:ext uri="{FF2B5EF4-FFF2-40B4-BE49-F238E27FC236}">
+                <a16:creationId xmlns:a16="http://schemas.microsoft.com/office/drawing/2014/main" id="{9166C3DB-93CF-4DBE-92E2-DC201CD72C22}"/>
+              </a:ext>
+            </a:extLst>
+          </p:cNvPr>
+          <p:cNvPicPr>
+            <a:picLocks noChangeAspect="1"/>
+          </p:cNvPicPr>
+          <p:nvPr/>
+        </p:nvPicPr>
+        <p:blipFill>
+          <a:blip r:embed="rId2"/>
+          <a:stretch>
+            <a:fillRect/>
+          </a:stretch>
+        </p:blipFill>
+        <p:spPr>
+          <a:xfrm>
+            <a:off x="5874938" y="2218826"/>
+            <a:ext cx="1889924" cy="2725148"/>
+          </a:xfrm>
+          <a:prstGeom prst="rect">
+            <a:avLst/>
+          </a:prstGeom>
+        </p:spPr>
+      </p:pic>
+      <p:sp>
+        <p:nvSpPr>
+          <p:cNvPr id="12" name="text 3">
+            <a:extLst>
+              <a:ext uri="{FF2B5EF4-FFF2-40B4-BE49-F238E27FC236}">
+                <a16:creationId xmlns:a16="http://schemas.microsoft.com/office/drawing/2014/main" id="{D7FCBCE2-90B9-44F8-B3C5-7E45EC39B186}"/>
+              </a:ext>
+            </a:extLst>
+          </p:cNvPr>
+          <p:cNvSpPr txBox="1"/>
+          <p:nvPr/>
+        </p:nvSpPr>
+        <p:spPr>
+          <a:xfrm>
+            <a:off x="953869" y="6096000"/>
+            <a:ext cx="7742761" cy="523220"/>
+          </a:xfrm>
+          <a:prstGeom prst="rect">
+            <a:avLst/>
+          </a:prstGeom>
+          <a:noFill/>
+        </p:spPr>
+        <p:txBody>
+          <a:bodyPr wrap="none" rtlCol="0">
+            <a:spAutoFit/>
+          </a:bodyPr>
+          <a:lstStyle/>
+          <a:p>
+            <a:r>
+              <a:rPr lang="en-US" sz="2800" b="1" dirty="0">
+                <a:solidFill>
+                  <a:schemeClr val="accent1"/>
+                </a:solidFill>
+              </a:rPr>
+              <a:t>Expected Output (pasted object is the right shape )</a:t>
+            </a:r>
+            <a:endParaRPr lang="en-SG" sz="2800" b="1" dirty="0">
+              <a:solidFill>
+                <a:schemeClr val="accent1"/>
+              </a:solidFill>
+            </a:endParaRPr>
           </a:p>
         </p:txBody>
       </p:sp>
     </p:spTree>
     <p:extLst>
       <p:ext uri="{BB962C8B-B14F-4D97-AF65-F5344CB8AC3E}">
-        <p14:creationId xmlns:p14="http://schemas.microsoft.com/office/powerpoint/2010/main" val="1929746620"/>
+        <p14:creationId xmlns:p14="http://schemas.microsoft.com/office/powerpoint/2010/main" val="421574400"/>
       </p:ext>
     </p:extLst>
   </p:cSld>
@@ -19008,157 +18966,6 @@
 </file>
 
 <file path=ppt/slides/slide38.xml><?xml version="1.0" encoding="utf-8"?>
-<p:sld xmlns:a="http://schemas.openxmlformats.org/drawingml/2006/main" xmlns:r="http://schemas.openxmlformats.org/officeDocument/2006/relationships" xmlns:p="http://schemas.openxmlformats.org/presentationml/2006/main">
-  <p:cSld>
-    <p:bg>
-      <p:bgPr>
-        <a:solidFill>
-          <a:schemeClr val="bg1"/>
-        </a:solidFill>
-        <a:effectLst/>
-      </p:bgPr>
-    </p:bg>
-    <p:spTree>
-      <p:nvGrpSpPr>
-        <p:cNvPr id="1" name=""/>
-        <p:cNvGrpSpPr/>
-        <p:nvPr/>
-      </p:nvGrpSpPr>
-      <p:grpSpPr>
-        <a:xfrm>
-          <a:off x="0" y="0"/>
-          <a:ext cx="0" cy="0"/>
-          <a:chOff x="0" y="0"/>
-          <a:chExt cx="0" cy="0"/>
-        </a:xfrm>
-      </p:grpSpPr>
-      <p:sp>
-        <p:nvSpPr>
-          <p:cNvPr id="11" name="Step Back This Shape">
-            <a:extLst>
-              <a:ext uri="{FF2B5EF4-FFF2-40B4-BE49-F238E27FC236}">
-                <a16:creationId xmlns:a16="http://schemas.microsoft.com/office/drawing/2014/main" id="{FBDDFFDE-4021-4A20-9F88-CF054D99B4A1}"/>
-              </a:ext>
-            </a:extLst>
-          </p:cNvPr>
-          <p:cNvSpPr/>
-          <p:nvPr/>
-        </p:nvSpPr>
-        <p:spPr>
-          <a:xfrm>
-            <a:off x="2209800" y="2902632"/>
-            <a:ext cx="1403648" cy="1052736"/>
-          </a:xfrm>
-          <a:prstGeom prst="rect">
-            <a:avLst/>
-          </a:prstGeom>
-          <a:ln/>
-        </p:spPr>
-        <p:style>
-          <a:lnRef idx="2">
-            <a:schemeClr val="accent1">
-              <a:shade val="50000"/>
-            </a:schemeClr>
-          </a:lnRef>
-          <a:fillRef idx="1">
-            <a:schemeClr val="accent1"/>
-          </a:fillRef>
-          <a:effectRef idx="0">
-            <a:schemeClr val="accent1"/>
-          </a:effectRef>
-          <a:fontRef idx="minor">
-            <a:schemeClr val="lt1"/>
-          </a:fontRef>
-        </p:style>
-        <p:txBody>
-          <a:bodyPr rtlCol="0" anchor="ctr"/>
-          <a:lstStyle/>
-          <a:p>
-            <a:pPr algn="ctr"/>
-            <a:r>
-              <a:rPr lang="en-US" sz="2800" dirty="0"/>
-              <a:t>Step Back</a:t>
-            </a:r>
-            <a:endParaRPr lang="en-SG" sz="2800" dirty="0"/>
-          </a:p>
-        </p:txBody>
-      </p:sp>
-      <p:sp>
-        <p:nvSpPr>
-          <p:cNvPr id="6" name="Rectangle 1">
-            <a:extLst>
-              <a:ext uri="{FF2B5EF4-FFF2-40B4-BE49-F238E27FC236}">
-                <a16:creationId xmlns:a16="http://schemas.microsoft.com/office/drawing/2014/main" id="{FE22D2C8-00F6-4FD2-A79F-FA75626CAE3E}"/>
-              </a:ext>
-            </a:extLst>
-          </p:cNvPr>
-          <p:cNvSpPr/>
-          <p:nvPr/>
-        </p:nvSpPr>
-        <p:spPr>
-          <a:xfrm>
-            <a:off x="4572000" y="2092356"/>
-            <a:ext cx="4378668" cy="2673288"/>
-          </a:xfrm>
-          <a:prstGeom prst="rect">
-            <a:avLst/>
-          </a:prstGeom>
-          <a:ln/>
-        </p:spPr>
-        <p:style>
-          <a:lnRef idx="2">
-            <a:schemeClr val="accent1">
-              <a:shade val="50000"/>
-            </a:schemeClr>
-          </a:lnRef>
-          <a:fillRef idx="1">
-            <a:schemeClr val="accent1"/>
-          </a:fillRef>
-          <a:effectRef idx="0">
-            <a:schemeClr val="accent1"/>
-          </a:effectRef>
-          <a:fontRef idx="minor">
-            <a:schemeClr val="lt1"/>
-          </a:fontRef>
-        </p:style>
-        <p:txBody>
-          <a:bodyPr rtlCol="0" anchor="ctr"/>
-          <a:lstStyle/>
-          <a:p>
-            <a:pPr algn="ctr"/>
-            <a:r>
-              <a:rPr lang="en-US" sz="2800" dirty="0"/>
-              <a:t>Action Slide</a:t>
-            </a:r>
-          </a:p>
-        </p:txBody>
-      </p:sp>
-    </p:spTree>
-    <p:extLst>
-      <p:ext uri="{BB962C8B-B14F-4D97-AF65-F5344CB8AC3E}">
-        <p14:creationId xmlns:p14="http://schemas.microsoft.com/office/powerpoint/2010/main" val="593895330"/>
-      </p:ext>
-    </p:extLst>
-  </p:cSld>
-  <p:clrMapOvr>
-    <a:masterClrMapping/>
-  </p:clrMapOvr>
-  <mc:AlternateContent xmlns:mc="http://schemas.openxmlformats.org/markup-compatibility/2006" xmlns:p14="http://schemas.microsoft.com/office/powerpoint/2010/main">
-    <mc:Choice Requires="p14">
-      <p:transition spd="slow" p14:dur="1500">
-        <p:split orient="vert"/>
-      </p:transition>
-    </mc:Choice>
-    <mc:Fallback xmlns="">
-      <p:transition spd="slow">
-        <p:split orient="vert"/>
-      </p:transition>
-    </mc:Fallback>
-  </mc:AlternateContent>
-</p:sld>
-</file>
-
-<file path=ppt/slides/slide39.xml><?xml version="1.0" encoding="utf-8"?>
 <p:sld xmlns:a="http://schemas.openxmlformats.org/drawingml/2006/main" xmlns:r="http://schemas.openxmlformats.org/officeDocument/2006/relationships" xmlns:p="http://schemas.openxmlformats.org/presentationml/2006/main">
   <p:cSld>
     <p:bg>
@@ -19264,84 +19071,161 @@
           </a:p>
         </p:txBody>
       </p:sp>
-      <p:pic>
-        <p:nvPicPr>
-          <p:cNvPr id="6" name="copied">
+    </p:spTree>
+    <p:extLst>
+      <p:ext uri="{BB962C8B-B14F-4D97-AF65-F5344CB8AC3E}">
+        <p14:creationId xmlns:p14="http://schemas.microsoft.com/office/powerpoint/2010/main" val="1929746620"/>
+      </p:ext>
+    </p:extLst>
+  </p:cSld>
+  <p:clrMapOvr>
+    <a:masterClrMapping/>
+  </p:clrMapOvr>
+  <mc:AlternateContent xmlns:mc="http://schemas.openxmlformats.org/markup-compatibility/2006" xmlns:p14="http://schemas.microsoft.com/office/powerpoint/2010/main">
+    <mc:Choice Requires="p14">
+      <p:transition spd="slow" p14:dur="1500">
+        <p:split orient="vert"/>
+      </p:transition>
+    </mc:Choice>
+    <mc:Fallback xmlns="">
+      <p:transition spd="slow">
+        <p:split orient="vert"/>
+      </p:transition>
+    </mc:Fallback>
+  </mc:AlternateContent>
+</p:sld>
+</file>
+
+<file path=ppt/slides/slide39.xml><?xml version="1.0" encoding="utf-8"?>
+<p:sld xmlns:a="http://schemas.openxmlformats.org/drawingml/2006/main" xmlns:r="http://schemas.openxmlformats.org/officeDocument/2006/relationships" xmlns:p="http://schemas.openxmlformats.org/presentationml/2006/main">
+  <p:cSld>
+    <p:bg>
+      <p:bgPr>
+        <a:solidFill>
+          <a:schemeClr val="bg1"/>
+        </a:solidFill>
+        <a:effectLst/>
+      </p:bgPr>
+    </p:bg>
+    <p:spTree>
+      <p:nvGrpSpPr>
+        <p:cNvPr id="1" name=""/>
+        <p:cNvGrpSpPr/>
+        <p:nvPr/>
+      </p:nvGrpSpPr>
+      <p:grpSpPr>
+        <a:xfrm>
+          <a:off x="0" y="0"/>
+          <a:ext cx="0" cy="0"/>
+          <a:chOff x="0" y="0"/>
+          <a:chExt cx="0" cy="0"/>
+        </a:xfrm>
+      </p:grpSpPr>
+      <p:sp>
+        <p:nvSpPr>
+          <p:cNvPr id="11" name="Step Back This Shape">
             <a:extLst>
               <a:ext uri="{FF2B5EF4-FFF2-40B4-BE49-F238E27FC236}">
-                <a16:creationId xmlns:a16="http://schemas.microsoft.com/office/drawing/2014/main" id="{723AD821-12F3-4268-ACEE-7DA402D9E1DF}"/>
+                <a16:creationId xmlns:a16="http://schemas.microsoft.com/office/drawing/2014/main" id="{FBDDFFDE-4021-4A20-9F88-CF054D99B4A1}"/>
               </a:ext>
             </a:extLst>
           </p:cNvPr>
-          <p:cNvPicPr>
-            <a:picLocks noChangeAspect="1"/>
-          </p:cNvPicPr>
+          <p:cNvSpPr/>
           <p:nvPr/>
-        </p:nvPicPr>
-        <p:blipFill>
-          <a:blip r:embed="rId2"/>
-          <a:stretch>
-            <a:fillRect/>
-          </a:stretch>
-        </p:blipFill>
+        </p:nvSpPr>
         <p:spPr>
           <a:xfrm>
-            <a:off x="5874938" y="2218826"/>
-            <a:ext cx="1889924" cy="2725148"/>
+            <a:off x="2209800" y="2902632"/>
+            <a:ext cx="1403648" cy="1052736"/>
           </a:xfrm>
           <a:prstGeom prst="rect">
             <a:avLst/>
           </a:prstGeom>
+          <a:ln/>
         </p:spPr>
-      </p:pic>
-      <p:sp>
-        <p:nvSpPr>
-          <p:cNvPr id="12" name="text 3">
+        <p:style>
+          <a:lnRef idx="2">
+            <a:schemeClr val="accent1">
+              <a:shade val="50000"/>
+            </a:schemeClr>
+          </a:lnRef>
+          <a:fillRef idx="1">
+            <a:schemeClr val="accent1"/>
+          </a:fillRef>
+          <a:effectRef idx="0">
+            <a:schemeClr val="accent1"/>
+          </a:effectRef>
+          <a:fontRef idx="minor">
+            <a:schemeClr val="lt1"/>
+          </a:fontRef>
+        </p:style>
+        <p:txBody>
+          <a:bodyPr rtlCol="0" anchor="ctr"/>
+          <a:lstStyle/>
+          <a:p>
+            <a:pPr algn="ctr"/>
+            <a:r>
+              <a:rPr lang="en-US" sz="2800" dirty="0"/>
+              <a:t>Step Back</a:t>
+            </a:r>
+            <a:endParaRPr lang="en-SG" sz="2800" dirty="0"/>
+          </a:p>
+        </p:txBody>
+      </p:sp>
+      <p:sp>
+        <p:nvSpPr>
+          <p:cNvPr id="6" name="Rectangle 1">
             <a:extLst>
               <a:ext uri="{FF2B5EF4-FFF2-40B4-BE49-F238E27FC236}">
-                <a16:creationId xmlns:a16="http://schemas.microsoft.com/office/drawing/2014/main" id="{ABBBD47D-D47D-4B55-8235-CC868FD764E1}"/>
+                <a16:creationId xmlns:a16="http://schemas.microsoft.com/office/drawing/2014/main" id="{FE22D2C8-00F6-4FD2-A79F-FA75626CAE3E}"/>
               </a:ext>
             </a:extLst>
           </p:cNvPr>
-          <p:cNvSpPr txBox="1"/>
+          <p:cNvSpPr/>
           <p:nvPr/>
         </p:nvSpPr>
         <p:spPr>
           <a:xfrm>
-            <a:off x="953869" y="6096000"/>
-            <a:ext cx="7742761" cy="523220"/>
+            <a:off x="4572000" y="2092356"/>
+            <a:ext cx="4378668" cy="2673288"/>
           </a:xfrm>
           <a:prstGeom prst="rect">
             <a:avLst/>
           </a:prstGeom>
-          <a:noFill/>
+          <a:ln/>
         </p:spPr>
-        <p:txBody>
-          <a:bodyPr wrap="none" rtlCol="0">
-            <a:spAutoFit/>
-          </a:bodyPr>
-          <a:lstStyle/>
-          <a:p>
-            <a:r>
-              <a:rPr lang="en-US" sz="2800" b="1" dirty="0">
-                <a:solidFill>
-                  <a:schemeClr val="accent1"/>
-                </a:solidFill>
-              </a:rPr>
-              <a:t>Expected Output (pasted object is the right shape )</a:t>
-            </a:r>
-            <a:endParaRPr lang="en-SG" sz="2800" b="1" dirty="0">
-              <a:solidFill>
-                <a:schemeClr val="accent1"/>
-              </a:solidFill>
-            </a:endParaRPr>
+        <p:style>
+          <a:lnRef idx="2">
+            <a:schemeClr val="accent1">
+              <a:shade val="50000"/>
+            </a:schemeClr>
+          </a:lnRef>
+          <a:fillRef idx="1">
+            <a:schemeClr val="accent1"/>
+          </a:fillRef>
+          <a:effectRef idx="0">
+            <a:schemeClr val="accent1"/>
+          </a:effectRef>
+          <a:fontRef idx="minor">
+            <a:schemeClr val="lt1"/>
+          </a:fontRef>
+        </p:style>
+        <p:txBody>
+          <a:bodyPr rtlCol="0" anchor="ctr"/>
+          <a:lstStyle/>
+          <a:p>
+            <a:pPr algn="ctr"/>
+            <a:r>
+              <a:rPr lang="en-US" sz="2800" dirty="0"/>
+              <a:t>Action Slide</a:t>
+            </a:r>
           </a:p>
         </p:txBody>
       </p:sp>
     </p:spTree>
     <p:extLst>
       <p:ext uri="{BB962C8B-B14F-4D97-AF65-F5344CB8AC3E}">
-        <p14:creationId xmlns:p14="http://schemas.microsoft.com/office/powerpoint/2010/main" val="3946917964"/>
+        <p14:creationId xmlns:p14="http://schemas.microsoft.com/office/powerpoint/2010/main" val="593895330"/>
       </p:ext>
     </p:extLst>
   </p:cSld>
@@ -19745,8 +19629,8 @@
         </p:nvSpPr>
         <p:spPr>
           <a:xfrm>
-            <a:off x="2133600" y="2784816"/>
-            <a:ext cx="2057400" cy="1288368"/>
+            <a:off x="2209800" y="2902632"/>
+            <a:ext cx="1403648" cy="1052736"/>
           </a:xfrm>
           <a:prstGeom prst="rect">
             <a:avLst/>
@@ -19776,16 +19660,90 @@
             <a:pPr algn="ctr"/>
             <a:r>
               <a:rPr lang="en-US" sz="2800" dirty="0"/>
-              <a:t>Step Back Background</a:t>
+              <a:t>Step Back</a:t>
             </a:r>
             <a:endParaRPr lang="en-SG" sz="2800" dirty="0"/>
+          </a:p>
+        </p:txBody>
+      </p:sp>
+      <p:pic>
+        <p:nvPicPr>
+          <p:cNvPr id="6" name="copied">
+            <a:extLst>
+              <a:ext uri="{FF2B5EF4-FFF2-40B4-BE49-F238E27FC236}">
+                <a16:creationId xmlns:a16="http://schemas.microsoft.com/office/drawing/2014/main" id="{723AD821-12F3-4268-ACEE-7DA402D9E1DF}"/>
+              </a:ext>
+            </a:extLst>
+          </p:cNvPr>
+          <p:cNvPicPr>
+            <a:picLocks noChangeAspect="1"/>
+          </p:cNvPicPr>
+          <p:nvPr/>
+        </p:nvPicPr>
+        <p:blipFill>
+          <a:blip r:embed="rId2"/>
+          <a:stretch>
+            <a:fillRect/>
+          </a:stretch>
+        </p:blipFill>
+        <p:spPr>
+          <a:xfrm>
+            <a:off x="5874938" y="2218826"/>
+            <a:ext cx="1889924" cy="2725148"/>
+          </a:xfrm>
+          <a:prstGeom prst="rect">
+            <a:avLst/>
+          </a:prstGeom>
+        </p:spPr>
+      </p:pic>
+      <p:sp>
+        <p:nvSpPr>
+          <p:cNvPr id="12" name="text 3">
+            <a:extLst>
+              <a:ext uri="{FF2B5EF4-FFF2-40B4-BE49-F238E27FC236}">
+                <a16:creationId xmlns:a16="http://schemas.microsoft.com/office/drawing/2014/main" id="{ABBBD47D-D47D-4B55-8235-CC868FD764E1}"/>
+              </a:ext>
+            </a:extLst>
+          </p:cNvPr>
+          <p:cNvSpPr txBox="1"/>
+          <p:nvPr/>
+        </p:nvSpPr>
+        <p:spPr>
+          <a:xfrm>
+            <a:off x="953869" y="6096000"/>
+            <a:ext cx="7742761" cy="523220"/>
+          </a:xfrm>
+          <a:prstGeom prst="rect">
+            <a:avLst/>
+          </a:prstGeom>
+          <a:noFill/>
+        </p:spPr>
+        <p:txBody>
+          <a:bodyPr wrap="none" rtlCol="0">
+            <a:spAutoFit/>
+          </a:bodyPr>
+          <a:lstStyle/>
+          <a:p>
+            <a:r>
+              <a:rPr lang="en-US" sz="2800" b="1" dirty="0">
+                <a:solidFill>
+                  <a:schemeClr val="accent1"/>
+                </a:solidFill>
+              </a:rPr>
+              <a:t>Expected Output (pasted object is the right shape )</a:t>
+            </a:r>
+            <a:endParaRPr lang="en-SG" sz="2800" b="1" dirty="0">
+              <a:solidFill>
+                <a:schemeClr val="accent1"/>
+              </a:solidFill>
+            </a:endParaRPr>
           </a:p>
         </p:txBody>
       </p:sp>
     </p:spTree>
     <p:extLst>
       <p:ext uri="{BB962C8B-B14F-4D97-AF65-F5344CB8AC3E}">
-        <p14:creationId xmlns:p14="http://schemas.microsoft.com/office/powerpoint/2010/main" val="943548674"/>
+        <p14:creationId xmlns:p14="http://schemas.microsoft.com/office/powerpoint/2010/main" val="3946917964"/>
       </p:ext>
     </p:extLst>
   </p:cSld>
@@ -19808,157 +19766,6 @@
 </file>
 
 <file path=ppt/slides/slide41.xml><?xml version="1.0" encoding="utf-8"?>
-<p:sld xmlns:a="http://schemas.openxmlformats.org/drawingml/2006/main" xmlns:r="http://schemas.openxmlformats.org/officeDocument/2006/relationships" xmlns:p="http://schemas.openxmlformats.org/presentationml/2006/main">
-  <p:cSld>
-    <p:bg>
-      <p:bgPr>
-        <a:solidFill>
-          <a:schemeClr val="bg1"/>
-        </a:solidFill>
-        <a:effectLst/>
-      </p:bgPr>
-    </p:bg>
-    <p:spTree>
-      <p:nvGrpSpPr>
-        <p:cNvPr id="1" name=""/>
-        <p:cNvGrpSpPr/>
-        <p:nvPr/>
-      </p:nvGrpSpPr>
-      <p:grpSpPr>
-        <a:xfrm>
-          <a:off x="0" y="0"/>
-          <a:ext cx="0" cy="0"/>
-          <a:chOff x="0" y="0"/>
-          <a:chExt cx="0" cy="0"/>
-        </a:xfrm>
-      </p:grpSpPr>
-      <p:sp>
-        <p:nvSpPr>
-          <p:cNvPr id="11" name="Step Back This Shape">
-            <a:extLst>
-              <a:ext uri="{FF2B5EF4-FFF2-40B4-BE49-F238E27FC236}">
-                <a16:creationId xmlns:a16="http://schemas.microsoft.com/office/drawing/2014/main" id="{FBDDFFDE-4021-4A20-9F88-CF054D99B4A1}"/>
-              </a:ext>
-            </a:extLst>
-          </p:cNvPr>
-          <p:cNvSpPr/>
-          <p:nvPr/>
-        </p:nvSpPr>
-        <p:spPr>
-          <a:xfrm>
-            <a:off x="2133600" y="2784816"/>
-            <a:ext cx="2057400" cy="1288368"/>
-          </a:xfrm>
-          <a:prstGeom prst="rect">
-            <a:avLst/>
-          </a:prstGeom>
-          <a:ln/>
-        </p:spPr>
-        <p:style>
-          <a:lnRef idx="2">
-            <a:schemeClr val="accent1">
-              <a:shade val="50000"/>
-            </a:schemeClr>
-          </a:lnRef>
-          <a:fillRef idx="1">
-            <a:schemeClr val="accent1"/>
-          </a:fillRef>
-          <a:effectRef idx="0">
-            <a:schemeClr val="accent1"/>
-          </a:effectRef>
-          <a:fontRef idx="minor">
-            <a:schemeClr val="lt1"/>
-          </a:fontRef>
-        </p:style>
-        <p:txBody>
-          <a:bodyPr rtlCol="0" anchor="ctr"/>
-          <a:lstStyle/>
-          <a:p>
-            <a:pPr algn="ctr"/>
-            <a:r>
-              <a:rPr lang="en-US" sz="2800" dirty="0"/>
-              <a:t>Step Back Background</a:t>
-            </a:r>
-            <a:endParaRPr lang="en-SG" sz="2800" dirty="0"/>
-          </a:p>
-        </p:txBody>
-      </p:sp>
-      <p:sp>
-        <p:nvSpPr>
-          <p:cNvPr id="8" name="Rectangle 1">
-            <a:extLst>
-              <a:ext uri="{FF2B5EF4-FFF2-40B4-BE49-F238E27FC236}">
-                <a16:creationId xmlns:a16="http://schemas.microsoft.com/office/drawing/2014/main" id="{3A44F3EA-C21A-444D-A20E-8DE75714E45A}"/>
-              </a:ext>
-            </a:extLst>
-          </p:cNvPr>
-          <p:cNvSpPr/>
-          <p:nvPr/>
-        </p:nvSpPr>
-        <p:spPr>
-          <a:xfrm>
-            <a:off x="4572000" y="2092356"/>
-            <a:ext cx="4378668" cy="2673288"/>
-          </a:xfrm>
-          <a:prstGeom prst="rect">
-            <a:avLst/>
-          </a:prstGeom>
-          <a:ln/>
-        </p:spPr>
-        <p:style>
-          <a:lnRef idx="2">
-            <a:schemeClr val="accent1">
-              <a:shade val="50000"/>
-            </a:schemeClr>
-          </a:lnRef>
-          <a:fillRef idx="1">
-            <a:schemeClr val="accent1"/>
-          </a:fillRef>
-          <a:effectRef idx="0">
-            <a:schemeClr val="accent1"/>
-          </a:effectRef>
-          <a:fontRef idx="minor">
-            <a:schemeClr val="lt1"/>
-          </a:fontRef>
-        </p:style>
-        <p:txBody>
-          <a:bodyPr rtlCol="0" anchor="ctr"/>
-          <a:lstStyle/>
-          <a:p>
-            <a:pPr algn="ctr"/>
-            <a:r>
-              <a:rPr lang="en-US" sz="2800" dirty="0"/>
-              <a:t>Action Slide</a:t>
-            </a:r>
-          </a:p>
-        </p:txBody>
-      </p:sp>
-    </p:spTree>
-    <p:extLst>
-      <p:ext uri="{BB962C8B-B14F-4D97-AF65-F5344CB8AC3E}">
-        <p14:creationId xmlns:p14="http://schemas.microsoft.com/office/powerpoint/2010/main" val="2065401390"/>
-      </p:ext>
-    </p:extLst>
-  </p:cSld>
-  <p:clrMapOvr>
-    <a:masterClrMapping/>
-  </p:clrMapOvr>
-  <mc:AlternateContent xmlns:mc="http://schemas.openxmlformats.org/markup-compatibility/2006" xmlns:p14="http://schemas.microsoft.com/office/powerpoint/2010/main">
-    <mc:Choice Requires="p14">
-      <p:transition spd="slow" p14:dur="1500">
-        <p:split orient="vert"/>
-      </p:transition>
-    </mc:Choice>
-    <mc:Fallback xmlns="">
-      <p:transition spd="slow">
-        <p:split orient="vert"/>
-      </p:transition>
-    </mc:Fallback>
-  </mc:AlternateContent>
-</p:sld>
-</file>
-
-<file path=ppt/slides/slide42.xml><?xml version="1.0" encoding="utf-8"?>
 <p:sld xmlns:a="http://schemas.openxmlformats.org/drawingml/2006/main" xmlns:r="http://schemas.openxmlformats.org/officeDocument/2006/relationships" xmlns:p="http://schemas.openxmlformats.org/presentationml/2006/main">
   <p:cSld>
     <p:bg>
@@ -20064,6 +19871,288 @@
           </a:p>
         </p:txBody>
       </p:sp>
+    </p:spTree>
+    <p:extLst>
+      <p:ext uri="{BB962C8B-B14F-4D97-AF65-F5344CB8AC3E}">
+        <p14:creationId xmlns:p14="http://schemas.microsoft.com/office/powerpoint/2010/main" val="943548674"/>
+      </p:ext>
+    </p:extLst>
+  </p:cSld>
+  <p:clrMapOvr>
+    <a:masterClrMapping/>
+  </p:clrMapOvr>
+  <mc:AlternateContent xmlns:mc="http://schemas.openxmlformats.org/markup-compatibility/2006" xmlns:p14="http://schemas.microsoft.com/office/powerpoint/2010/main">
+    <mc:Choice Requires="p14">
+      <p:transition spd="slow" p14:dur="1500">
+        <p:split orient="vert"/>
+      </p:transition>
+    </mc:Choice>
+    <mc:Fallback xmlns="">
+      <p:transition spd="slow">
+        <p:split orient="vert"/>
+      </p:transition>
+    </mc:Fallback>
+  </mc:AlternateContent>
+</p:sld>
+</file>
+
+<file path=ppt/slides/slide42.xml><?xml version="1.0" encoding="utf-8"?>
+<p:sld xmlns:a="http://schemas.openxmlformats.org/drawingml/2006/main" xmlns:r="http://schemas.openxmlformats.org/officeDocument/2006/relationships" xmlns:p="http://schemas.openxmlformats.org/presentationml/2006/main">
+  <p:cSld>
+    <p:bg>
+      <p:bgPr>
+        <a:solidFill>
+          <a:schemeClr val="bg1"/>
+        </a:solidFill>
+        <a:effectLst/>
+      </p:bgPr>
+    </p:bg>
+    <p:spTree>
+      <p:nvGrpSpPr>
+        <p:cNvPr id="1" name=""/>
+        <p:cNvGrpSpPr/>
+        <p:nvPr/>
+      </p:nvGrpSpPr>
+      <p:grpSpPr>
+        <a:xfrm>
+          <a:off x="0" y="0"/>
+          <a:ext cx="0" cy="0"/>
+          <a:chOff x="0" y="0"/>
+          <a:chExt cx="0" cy="0"/>
+        </a:xfrm>
+      </p:grpSpPr>
+      <p:sp>
+        <p:nvSpPr>
+          <p:cNvPr id="11" name="Step Back This Shape">
+            <a:extLst>
+              <a:ext uri="{FF2B5EF4-FFF2-40B4-BE49-F238E27FC236}">
+                <a16:creationId xmlns:a16="http://schemas.microsoft.com/office/drawing/2014/main" id="{FBDDFFDE-4021-4A20-9F88-CF054D99B4A1}"/>
+              </a:ext>
+            </a:extLst>
+          </p:cNvPr>
+          <p:cNvSpPr/>
+          <p:nvPr/>
+        </p:nvSpPr>
+        <p:spPr>
+          <a:xfrm>
+            <a:off x="2133600" y="2784816"/>
+            <a:ext cx="2057400" cy="1288368"/>
+          </a:xfrm>
+          <a:prstGeom prst="rect">
+            <a:avLst/>
+          </a:prstGeom>
+          <a:ln/>
+        </p:spPr>
+        <p:style>
+          <a:lnRef idx="2">
+            <a:schemeClr val="accent1">
+              <a:shade val="50000"/>
+            </a:schemeClr>
+          </a:lnRef>
+          <a:fillRef idx="1">
+            <a:schemeClr val="accent1"/>
+          </a:fillRef>
+          <a:effectRef idx="0">
+            <a:schemeClr val="accent1"/>
+          </a:effectRef>
+          <a:fontRef idx="minor">
+            <a:schemeClr val="lt1"/>
+          </a:fontRef>
+        </p:style>
+        <p:txBody>
+          <a:bodyPr rtlCol="0" anchor="ctr"/>
+          <a:lstStyle/>
+          <a:p>
+            <a:pPr algn="ctr"/>
+            <a:r>
+              <a:rPr lang="en-US" sz="2800" dirty="0"/>
+              <a:t>Step Back Background</a:t>
+            </a:r>
+            <a:endParaRPr lang="en-SG" sz="2800" dirty="0"/>
+          </a:p>
+        </p:txBody>
+      </p:sp>
+      <p:sp>
+        <p:nvSpPr>
+          <p:cNvPr id="8" name="Rectangle 1">
+            <a:extLst>
+              <a:ext uri="{FF2B5EF4-FFF2-40B4-BE49-F238E27FC236}">
+                <a16:creationId xmlns:a16="http://schemas.microsoft.com/office/drawing/2014/main" id="{3A44F3EA-C21A-444D-A20E-8DE75714E45A}"/>
+              </a:ext>
+            </a:extLst>
+          </p:cNvPr>
+          <p:cNvSpPr/>
+          <p:nvPr/>
+        </p:nvSpPr>
+        <p:spPr>
+          <a:xfrm>
+            <a:off x="4572000" y="2092356"/>
+            <a:ext cx="4378668" cy="2673288"/>
+          </a:xfrm>
+          <a:prstGeom prst="rect">
+            <a:avLst/>
+          </a:prstGeom>
+          <a:ln/>
+        </p:spPr>
+        <p:style>
+          <a:lnRef idx="2">
+            <a:schemeClr val="accent1">
+              <a:shade val="50000"/>
+            </a:schemeClr>
+          </a:lnRef>
+          <a:fillRef idx="1">
+            <a:schemeClr val="accent1"/>
+          </a:fillRef>
+          <a:effectRef idx="0">
+            <a:schemeClr val="accent1"/>
+          </a:effectRef>
+          <a:fontRef idx="minor">
+            <a:schemeClr val="lt1"/>
+          </a:fontRef>
+        </p:style>
+        <p:txBody>
+          <a:bodyPr rtlCol="0" anchor="ctr"/>
+          <a:lstStyle/>
+          <a:p>
+            <a:pPr algn="ctr"/>
+            <a:r>
+              <a:rPr lang="en-US" sz="2800" dirty="0"/>
+              <a:t>Action Slide</a:t>
+            </a:r>
+          </a:p>
+        </p:txBody>
+      </p:sp>
+    </p:spTree>
+    <p:extLst>
+      <p:ext uri="{BB962C8B-B14F-4D97-AF65-F5344CB8AC3E}">
+        <p14:creationId xmlns:p14="http://schemas.microsoft.com/office/powerpoint/2010/main" val="2065401390"/>
+      </p:ext>
+    </p:extLst>
+  </p:cSld>
+  <p:clrMapOvr>
+    <a:masterClrMapping/>
+  </p:clrMapOvr>
+  <mc:AlternateContent xmlns:mc="http://schemas.openxmlformats.org/markup-compatibility/2006" xmlns:p14="http://schemas.microsoft.com/office/powerpoint/2010/main">
+    <mc:Choice Requires="p14">
+      <p:transition spd="slow" p14:dur="1500">
+        <p:split orient="vert"/>
+      </p:transition>
+    </mc:Choice>
+    <mc:Fallback xmlns="">
+      <p:transition spd="slow">
+        <p:split orient="vert"/>
+      </p:transition>
+    </mc:Fallback>
+  </mc:AlternateContent>
+</p:sld>
+</file>
+
+<file path=ppt/slides/slide43.xml><?xml version="1.0" encoding="utf-8"?>
+<p:sld xmlns:a="http://schemas.openxmlformats.org/drawingml/2006/main" xmlns:r="http://schemas.openxmlformats.org/officeDocument/2006/relationships" xmlns:p="http://schemas.openxmlformats.org/presentationml/2006/main">
+  <p:cSld>
+    <p:bg>
+      <p:bgPr>
+        <a:solidFill>
+          <a:schemeClr val="bg1"/>
+        </a:solidFill>
+        <a:effectLst/>
+      </p:bgPr>
+    </p:bg>
+    <p:spTree>
+      <p:nvGrpSpPr>
+        <p:cNvPr id="1" name=""/>
+        <p:cNvGrpSpPr/>
+        <p:nvPr/>
+      </p:nvGrpSpPr>
+      <p:grpSpPr>
+        <a:xfrm>
+          <a:off x="0" y="0"/>
+          <a:ext cx="0" cy="0"/>
+          <a:chOff x="0" y="0"/>
+          <a:chExt cx="0" cy="0"/>
+        </a:xfrm>
+      </p:grpSpPr>
+      <p:pic>
+        <p:nvPicPr>
+          <p:cNvPr id="10" name="pictocopy">
+            <a:extLst>
+              <a:ext uri="{FF2B5EF4-FFF2-40B4-BE49-F238E27FC236}">
+                <a16:creationId xmlns:a16="http://schemas.microsoft.com/office/drawing/2014/main" id="{3CA64550-5AE2-4F22-9C68-8C66CE5663E9}"/>
+              </a:ext>
+            </a:extLst>
+          </p:cNvPr>
+          <p:cNvPicPr>
+            <a:picLocks noChangeAspect="1"/>
+          </p:cNvPicPr>
+          <p:nvPr/>
+        </p:nvPicPr>
+        <p:blipFill>
+          <a:blip r:embed="rId2"/>
+          <a:stretch>
+            <a:fillRect/>
+          </a:stretch>
+        </p:blipFill>
+        <p:spPr>
+          <a:xfrm>
+            <a:off x="5722538" y="2066426"/>
+            <a:ext cx="1889924" cy="2725148"/>
+          </a:xfrm>
+          <a:prstGeom prst="rect">
+            <a:avLst/>
+          </a:prstGeom>
+        </p:spPr>
+      </p:pic>
+      <p:sp>
+        <p:nvSpPr>
+          <p:cNvPr id="11" name="Step Back This Shape">
+            <a:extLst>
+              <a:ext uri="{FF2B5EF4-FFF2-40B4-BE49-F238E27FC236}">
+                <a16:creationId xmlns:a16="http://schemas.microsoft.com/office/drawing/2014/main" id="{FBDDFFDE-4021-4A20-9F88-CF054D99B4A1}"/>
+              </a:ext>
+            </a:extLst>
+          </p:cNvPr>
+          <p:cNvSpPr/>
+          <p:nvPr/>
+        </p:nvSpPr>
+        <p:spPr>
+          <a:xfrm>
+            <a:off x="2133600" y="2784816"/>
+            <a:ext cx="2057400" cy="1288368"/>
+          </a:xfrm>
+          <a:prstGeom prst="rect">
+            <a:avLst/>
+          </a:prstGeom>
+          <a:ln/>
+        </p:spPr>
+        <p:style>
+          <a:lnRef idx="2">
+            <a:schemeClr val="accent1">
+              <a:shade val="50000"/>
+            </a:schemeClr>
+          </a:lnRef>
+          <a:fillRef idx="1">
+            <a:schemeClr val="accent1"/>
+          </a:fillRef>
+          <a:effectRef idx="0">
+            <a:schemeClr val="accent1"/>
+          </a:effectRef>
+          <a:fontRef idx="minor">
+            <a:schemeClr val="lt1"/>
+          </a:fontRef>
+        </p:style>
+        <p:txBody>
+          <a:bodyPr rtlCol="0" anchor="ctr"/>
+          <a:lstStyle/>
+          <a:p>
+            <a:pPr algn="ctr"/>
+            <a:r>
+              <a:rPr lang="en-US" sz="2800" dirty="0"/>
+              <a:t>Step Back Background</a:t>
+            </a:r>
+            <a:endParaRPr lang="en-SG" sz="2800" dirty="0"/>
+          </a:p>
+        </p:txBody>
+      </p:sp>
       <p:pic>
         <p:nvPicPr>
           <p:cNvPr id="6" name="copied">
@@ -20163,7 +20252,7 @@
 </p:sld>
 </file>
 
-<file path=ppt/slides/slide43.xml><?xml version="1.0" encoding="utf-8"?>
+<file path=ppt/slides/slide44.xml><?xml version="1.0" encoding="utf-8"?>
 <p:sld xmlns:a="http://schemas.openxmlformats.org/drawingml/2006/main" xmlns:r="http://schemas.openxmlformats.org/officeDocument/2006/relationships" xmlns:p="http://schemas.openxmlformats.org/presentationml/2006/main" show="0">
   <p:cSld name="PPTLabsAcknowledgementSlide">
     <p:spTree>

</xml_diff>